<commit_message>
Predefinido por estado Completo
</commit_message>
<xml_diff>
--- a/visitas_stg/static/ppt/Reporte_Estado_sisef.pptx
+++ b/visitas_stg/static/ppt/Reporte_Estado_sisef.pptx
@@ -225,7 +225,7 @@
           <a:p>
             <a:fld id="{A12F159B-2BA9-4A4C-8F37-6A12CA4521B5}" type="datetimeFigureOut">
               <a:rPr lang="es-MX" smtClean="0"/>
-              <a:t>24/10/2015</a:t>
+              <a:t>26/10/2015</a:t>
             </a:fld>
             <a:endParaRPr lang="es-MX"/>
           </a:p>
@@ -390,7 +390,7 @@
           <a:p>
             <a:fld id="{E725DF0C-0434-4166-AFB2-E9FB5C8C5747}" type="datetimeFigureOut">
               <a:rPr lang="es-MX" smtClean="0"/>
-              <a:t>24/10/2015</a:t>
+              <a:t>26/10/2015</a:t>
             </a:fld>
             <a:endParaRPr lang="es-MX"/>
           </a:p>
@@ -853,7 +853,7 @@
           <a:p>
             <a:fld id="{F4C741E7-0659-46B3-91BB-B8C3B98C4B5D}" type="datetimeFigureOut">
               <a:rPr lang="es-MX" smtClean="0"/>
-              <a:t>24/10/2015</a:t>
+              <a:t>26/10/2015</a:t>
             </a:fld>
             <a:endParaRPr lang="es-MX"/>
           </a:p>
@@ -1070,7 +1070,7 @@
           <a:p>
             <a:fld id="{F4C741E7-0659-46B3-91BB-B8C3B98C4B5D}" type="datetimeFigureOut">
               <a:rPr lang="es-MX" smtClean="0"/>
-              <a:t>24/10/2015</a:t>
+              <a:t>26/10/2015</a:t>
             </a:fld>
             <a:endParaRPr lang="es-MX"/>
           </a:p>
@@ -1280,7 +1280,7 @@
           <a:p>
             <a:fld id="{F4C741E7-0659-46B3-91BB-B8C3B98C4B5D}" type="datetimeFigureOut">
               <a:rPr lang="es-MX" smtClean="0"/>
-              <a:t>24/10/2015</a:t>
+              <a:t>26/10/2015</a:t>
             </a:fld>
             <a:endParaRPr lang="es-MX"/>
           </a:p>
@@ -1490,7 +1490,7 @@
           <a:p>
             <a:fld id="{F4C741E7-0659-46B3-91BB-B8C3B98C4B5D}" type="datetimeFigureOut">
               <a:rPr lang="es-MX" smtClean="0"/>
-              <a:t>24/10/2015</a:t>
+              <a:t>26/10/2015</a:t>
             </a:fld>
             <a:endParaRPr lang="es-MX"/>
           </a:p>
@@ -1766,7 +1766,7 @@
           <a:p>
             <a:fld id="{F4C741E7-0659-46B3-91BB-B8C3B98C4B5D}" type="datetimeFigureOut">
               <a:rPr lang="es-MX" smtClean="0"/>
-              <a:t>24/10/2015</a:t>
+              <a:t>26/10/2015</a:t>
             </a:fld>
             <a:endParaRPr lang="es-MX"/>
           </a:p>
@@ -2092,7 +2092,7 @@
           <a:p>
             <a:fld id="{F4C741E7-0659-46B3-91BB-B8C3B98C4B5D}" type="datetimeFigureOut">
               <a:rPr lang="es-MX" smtClean="0"/>
-              <a:t>24/10/2015</a:t>
+              <a:t>26/10/2015</a:t>
             </a:fld>
             <a:endParaRPr lang="es-MX"/>
           </a:p>
@@ -2558,7 +2558,7 @@
           <a:p>
             <a:fld id="{F4C741E7-0659-46B3-91BB-B8C3B98C4B5D}" type="datetimeFigureOut">
               <a:rPr lang="es-MX" smtClean="0"/>
-              <a:t>24/10/2015</a:t>
+              <a:t>26/10/2015</a:t>
             </a:fld>
             <a:endParaRPr lang="es-MX"/>
           </a:p>
@@ -2708,7 +2708,7 @@
           <a:p>
             <a:fld id="{F4C741E7-0659-46B3-91BB-B8C3B98C4B5D}" type="datetimeFigureOut">
               <a:rPr lang="es-MX" smtClean="0"/>
-              <a:t>24/10/2015</a:t>
+              <a:t>26/10/2015</a:t>
             </a:fld>
             <a:endParaRPr lang="es-MX"/>
           </a:p>
@@ -2827,7 +2827,7 @@
           <a:p>
             <a:fld id="{F4C741E7-0659-46B3-91BB-B8C3B98C4B5D}" type="datetimeFigureOut">
               <a:rPr lang="es-MX" smtClean="0"/>
-              <a:t>24/10/2015</a:t>
+              <a:t>26/10/2015</a:t>
             </a:fld>
             <a:endParaRPr lang="es-MX"/>
           </a:p>
@@ -3137,7 +3137,7 @@
           <a:p>
             <a:fld id="{F4C741E7-0659-46B3-91BB-B8C3B98C4B5D}" type="datetimeFigureOut">
               <a:rPr lang="es-MX" smtClean="0"/>
-              <a:t>24/10/2015</a:t>
+              <a:t>26/10/2015</a:t>
             </a:fld>
             <a:endParaRPr lang="es-MX"/>
           </a:p>
@@ -3423,7 +3423,7 @@
           <a:p>
             <a:fld id="{F4C741E7-0659-46B3-91BB-B8C3B98C4B5D}" type="datetimeFigureOut">
               <a:rPr lang="es-MX" smtClean="0"/>
-              <a:t>24/10/2015</a:t>
+              <a:t>26/10/2015</a:t>
             </a:fld>
             <a:endParaRPr lang="es-MX"/>
           </a:p>
@@ -6856,11 +6856,6 @@
               </a:rPr>
               <a:t>x</a:t>
             </a:r>
-            <a:endParaRPr lang="es-MX" sz="800" b="1" dirty="0">
-              <a:latin typeface="Verdana" panose="020B0604030504040204" pitchFamily="34" charset="0"/>
-              <a:ea typeface="Verdana" panose="020B0604030504040204" pitchFamily="34" charset="0"/>
-              <a:cs typeface="Verdana" panose="020B0604030504040204" pitchFamily="34" charset="0"/>
-            </a:endParaRPr>
           </a:p>
         </p:txBody>
       </p:sp>
@@ -6904,44 +6899,6 @@
       </p:sp>
       <p:sp>
         <p:nvSpPr>
-          <p:cNvPr id="33" name="32 CuadroTexto"/>
-          <p:cNvSpPr txBox="1"/>
-          <p:nvPr/>
-        </p:nvSpPr>
-        <p:spPr>
-          <a:xfrm>
-            <a:off x="4275887" y="1343969"/>
-            <a:ext cx="1476000" cy="195814"/>
-          </a:xfrm>
-          <a:prstGeom prst="rect">
-            <a:avLst/>
-          </a:prstGeom>
-          <a:noFill/>
-        </p:spPr>
-        <p:txBody>
-          <a:bodyPr wrap="square" lIns="36000" tIns="36000" rIns="36000" bIns="36000" rtlCol="0">
-            <a:spAutoFit/>
-          </a:bodyPr>
-          <a:lstStyle/>
-          <a:p>
-            <a:r>
-              <a:rPr lang="es-MX" sz="800" b="1" dirty="0" smtClean="0">
-                <a:latin typeface="Verdana" panose="020B0604030504040204" pitchFamily="34" charset="0"/>
-                <a:ea typeface="Verdana" panose="020B0604030504040204" pitchFamily="34" charset="0"/>
-                <a:cs typeface="Verdana" panose="020B0604030504040204" pitchFamily="34" charset="0"/>
-              </a:rPr>
-              <a:t>x</a:t>
-            </a:r>
-            <a:endParaRPr lang="es-MX" sz="800" b="1" dirty="0">
-              <a:latin typeface="Verdana" panose="020B0604030504040204" pitchFamily="34" charset="0"/>
-              <a:ea typeface="Verdana" panose="020B0604030504040204" pitchFamily="34" charset="0"/>
-              <a:cs typeface="Verdana" panose="020B0604030504040204" pitchFamily="34" charset="0"/>
-            </a:endParaRPr>
-          </a:p>
-        </p:txBody>
-      </p:sp>
-      <p:sp>
-        <p:nvSpPr>
           <p:cNvPr id="31" name="30 CuadroTexto"/>
           <p:cNvSpPr txBox="1"/>
           <p:nvPr/>
@@ -6970,11 +6927,6 @@
               </a:rPr>
               <a:t>x</a:t>
             </a:r>
-            <a:endParaRPr lang="es-MX" sz="800" b="1" dirty="0">
-              <a:latin typeface="Verdana" panose="020B0604030504040204" pitchFamily="34" charset="0"/>
-              <a:ea typeface="Verdana" panose="020B0604030504040204" pitchFamily="34" charset="0"/>
-              <a:cs typeface="Verdana" panose="020B0604030504040204" pitchFamily="34" charset="0"/>
-            </a:endParaRPr>
           </a:p>
         </p:txBody>
       </p:sp>
@@ -7008,11 +6960,6 @@
               </a:rPr>
               <a:t>x</a:t>
             </a:r>
-            <a:endParaRPr lang="es-MX" sz="800" b="1" dirty="0">
-              <a:latin typeface="Verdana" panose="020B0604030504040204" pitchFamily="34" charset="0"/>
-              <a:ea typeface="Verdana" panose="020B0604030504040204" pitchFamily="34" charset="0"/>
-              <a:cs typeface="Verdana" panose="020B0604030504040204" pitchFamily="34" charset="0"/>
-            </a:endParaRPr>
           </a:p>
         </p:txBody>
       </p:sp>
@@ -7160,7 +7107,7 @@
           <p:nvPr>
             <p:extLst>
               <p:ext uri="{D42A27DB-BD31-4B8C-83A1-F6EECF244321}">
-                <p14:modId xmlns:p14="http://schemas.microsoft.com/office/powerpoint/2010/main" val="3240843868"/>
+                <p14:modId xmlns:p14="http://schemas.microsoft.com/office/powerpoint/2010/main" val="2863359421"/>
               </p:ext>
             </p:extLst>
           </p:nvPr>
@@ -7319,17 +7266,6 @@
                     <a:bodyPr/>
                     <a:lstStyle/>
                     <a:p>
-                      <a:r>
-                        <a:rPr lang="es-MX" sz="800" dirty="0" smtClean="0">
-                          <a:solidFill>
-                            <a:schemeClr val="tx1"/>
-                          </a:solidFill>
-                          <a:latin typeface="Verdana" panose="020B0604030504040204" pitchFamily="34" charset="0"/>
-                          <a:ea typeface="Verdana" panose="020B0604030504040204" pitchFamily="34" charset="0"/>
-                          <a:cs typeface="Verdana" panose="020B0604030504040204" pitchFamily="34" charset="0"/>
-                        </a:rPr>
-                        <a:t>Partido Gobernante:</a:t>
-                      </a:r>
                       <a:endParaRPr lang="es-MX" sz="800" dirty="0">
                         <a:solidFill>
                           <a:schemeClr val="tx1"/>
@@ -7589,6 +7525,162 @@
           <a:p>
             <a:pPr algn="ctr"/>
             <a:endParaRPr lang="es-MX"/>
+          </a:p>
+        </p:txBody>
+      </p:sp>
+      <p:sp>
+        <p:nvSpPr>
+          <p:cNvPr id="21" name="93 CuadroTexto"/>
+          <p:cNvSpPr txBox="1"/>
+          <p:nvPr/>
+        </p:nvSpPr>
+        <p:spPr>
+          <a:xfrm>
+            <a:off x="6769346" y="4011953"/>
+            <a:ext cx="1395807" cy="215444"/>
+          </a:xfrm>
+          <a:prstGeom prst="rect">
+            <a:avLst/>
+          </a:prstGeom>
+          <a:noFill/>
+        </p:spPr>
+        <p:txBody>
+          <a:bodyPr wrap="square" rtlCol="0">
+            <a:spAutoFit/>
+          </a:bodyPr>
+          <a:lstStyle/>
+          <a:p>
+            <a:pPr algn="ctr"/>
+            <a:r>
+              <a:rPr lang="es-MX" sz="800" b="1" dirty="0" smtClean="0">
+                <a:latin typeface="Verdana" panose="020B0604030504040204" pitchFamily="34" charset="0"/>
+                <a:ea typeface="Verdana" panose="020B0604030504040204" pitchFamily="34" charset="0"/>
+                <a:cs typeface="Verdana" panose="020B0604030504040204" pitchFamily="34" charset="0"/>
+              </a:rPr>
+              <a:t>Actividades</a:t>
+            </a:r>
+            <a:endParaRPr lang="es-MX" sz="800" b="1" dirty="0">
+              <a:latin typeface="Verdana" panose="020B0604030504040204" pitchFamily="34" charset="0"/>
+              <a:ea typeface="Verdana" panose="020B0604030504040204" pitchFamily="34" charset="0"/>
+              <a:cs typeface="Verdana" panose="020B0604030504040204" pitchFamily="34" charset="0"/>
+            </a:endParaRPr>
+          </a:p>
+        </p:txBody>
+      </p:sp>
+      <p:sp>
+        <p:nvSpPr>
+          <p:cNvPr id="22" name="93 CuadroTexto"/>
+          <p:cNvSpPr txBox="1"/>
+          <p:nvPr/>
+        </p:nvSpPr>
+        <p:spPr>
+          <a:xfrm>
+            <a:off x="152225" y="5794278"/>
+            <a:ext cx="4054222" cy="215444"/>
+          </a:xfrm>
+          <a:prstGeom prst="rect">
+            <a:avLst/>
+          </a:prstGeom>
+          <a:noFill/>
+        </p:spPr>
+        <p:txBody>
+          <a:bodyPr wrap="square" rtlCol="0">
+            <a:spAutoFit/>
+          </a:bodyPr>
+          <a:lstStyle/>
+          <a:p>
+            <a:pPr algn="ctr"/>
+            <a:r>
+              <a:rPr lang="es-MX" sz="800" b="1" dirty="0" smtClean="0">
+                <a:latin typeface="Verdana" panose="020B0604030504040204" pitchFamily="34" charset="0"/>
+                <a:ea typeface="Verdana" panose="020B0604030504040204" pitchFamily="34" charset="0"/>
+                <a:cs typeface="Verdana" panose="020B0604030504040204" pitchFamily="34" charset="0"/>
+              </a:rPr>
+              <a:t>Problemática Sociopolítica</a:t>
+            </a:r>
+            <a:endParaRPr lang="es-MX" sz="800" b="1" dirty="0">
+              <a:latin typeface="Verdana" panose="020B0604030504040204" pitchFamily="34" charset="0"/>
+              <a:ea typeface="Verdana" panose="020B0604030504040204" pitchFamily="34" charset="0"/>
+              <a:cs typeface="Verdana" panose="020B0604030504040204" pitchFamily="34" charset="0"/>
+            </a:endParaRPr>
+          </a:p>
+        </p:txBody>
+      </p:sp>
+      <p:sp>
+        <p:nvSpPr>
+          <p:cNvPr id="23" name="93 CuadroTexto"/>
+          <p:cNvSpPr txBox="1"/>
+          <p:nvPr/>
+        </p:nvSpPr>
+        <p:spPr>
+          <a:xfrm>
+            <a:off x="115814" y="6021288"/>
+            <a:ext cx="4054222" cy="707886"/>
+          </a:xfrm>
+          <a:prstGeom prst="rect">
+            <a:avLst/>
+          </a:prstGeom>
+          <a:noFill/>
+        </p:spPr>
+        <p:txBody>
+          <a:bodyPr wrap="square" rtlCol="0">
+            <a:spAutoFit/>
+          </a:bodyPr>
+          <a:lstStyle/>
+          <a:p>
+            <a:pPr marL="171450" indent="-171450" algn="just">
+              <a:buFont typeface="Wingdings" panose="05000000000000000000" pitchFamily="2" charset="2"/>
+              <a:buChar char="q"/>
+            </a:pPr>
+            <a:endParaRPr lang="es-MX" sz="800" dirty="0">
+              <a:latin typeface="Verdana" panose="020B0604030504040204" pitchFamily="34" charset="0"/>
+              <a:ea typeface="Verdana" panose="020B0604030504040204" pitchFamily="34" charset="0"/>
+              <a:cs typeface="Verdana" panose="020B0604030504040204" pitchFamily="34" charset="0"/>
+            </a:endParaRPr>
+          </a:p>
+          <a:p>
+            <a:pPr marL="171450" indent="-171450" algn="just">
+              <a:buFont typeface="Wingdings" panose="05000000000000000000" pitchFamily="2" charset="2"/>
+              <a:buChar char="q"/>
+            </a:pPr>
+            <a:endParaRPr lang="es-MX" sz="800" dirty="0" smtClean="0">
+              <a:latin typeface="Verdana" panose="020B0604030504040204" pitchFamily="34" charset="0"/>
+              <a:ea typeface="Verdana" panose="020B0604030504040204" pitchFamily="34" charset="0"/>
+              <a:cs typeface="Verdana" panose="020B0604030504040204" pitchFamily="34" charset="0"/>
+            </a:endParaRPr>
+          </a:p>
+          <a:p>
+            <a:pPr marL="171450" indent="-171450" algn="just">
+              <a:buFont typeface="Wingdings" panose="05000000000000000000" pitchFamily="2" charset="2"/>
+              <a:buChar char="q"/>
+            </a:pPr>
+            <a:endParaRPr lang="es-MX" sz="800" dirty="0">
+              <a:latin typeface="Verdana" panose="020B0604030504040204" pitchFamily="34" charset="0"/>
+              <a:ea typeface="Verdana" panose="020B0604030504040204" pitchFamily="34" charset="0"/>
+              <a:cs typeface="Verdana" panose="020B0604030504040204" pitchFamily="34" charset="0"/>
+            </a:endParaRPr>
+          </a:p>
+          <a:p>
+            <a:pPr marL="171450" indent="-171450" algn="just">
+              <a:buFont typeface="Wingdings" panose="05000000000000000000" pitchFamily="2" charset="2"/>
+              <a:buChar char="q"/>
+            </a:pPr>
+            <a:endParaRPr lang="es-MX" sz="800" dirty="0" smtClean="0">
+              <a:latin typeface="Verdana" panose="020B0604030504040204" pitchFamily="34" charset="0"/>
+              <a:ea typeface="Verdana" panose="020B0604030504040204" pitchFamily="34" charset="0"/>
+              <a:cs typeface="Verdana" panose="020B0604030504040204" pitchFamily="34" charset="0"/>
+            </a:endParaRPr>
+          </a:p>
+          <a:p>
+            <a:pPr marL="171450" indent="-171450" algn="just">
+              <a:buFont typeface="Wingdings" panose="05000000000000000000" pitchFamily="2" charset="2"/>
+              <a:buChar char="q"/>
+            </a:pPr>
+            <a:endParaRPr lang="es-MX" sz="800" dirty="0">
+              <a:latin typeface="Verdana" panose="020B0604030504040204" pitchFamily="34" charset="0"/>
+              <a:ea typeface="Verdana" panose="020B0604030504040204" pitchFamily="34" charset="0"/>
+              <a:cs typeface="Verdana" panose="020B0604030504040204" pitchFamily="34" charset="0"/>
+            </a:endParaRPr>
           </a:p>
         </p:txBody>
       </p:sp>

</xml_diff>